<commit_message>
Oops. Now with Github links
</commit_message>
<xml_diff>
--- a/MPI_Workshop.pptx
+++ b/MPI_Workshop.pptx
@@ -21428,25 +21428,48 @@
             </a:r>
             <a:r>
               <a:rPr lang="en-US" dirty="0"/>
-              <a:t> repo will contain lecture notes and this </a:t>
+              <a:t> repo will contain lecture notes and this PowerPoint</a:t>
             </a:r>
-            <a:r>
-              <a:rPr lang="en-US" dirty="0" err="1"/>
-              <a:t>powerpoint</a:t>
-            </a:r>
-            <a:endParaRPr lang="en-US" dirty="0"/>
           </a:p>
           <a:p>
             <a:pPr lvl="1"/>
             <a:r>
               <a:rPr lang="en-US" dirty="0"/>
-              <a:t>At this link here (TBD)</a:t>
+              <a:t>At this link here: </a:t>
             </a:r>
+            <a:r>
+              <a:rPr lang="en-US" dirty="0">
+                <a:hlinkClick r:id="rId2"/>
+              </a:rPr>
+              <a:t>https://github.com/ValenYamamoto/IEEE_MPI_Workshop</a:t>
+            </a:r>
+            <a:endParaRPr lang="en-US" dirty="0"/>
           </a:p>
           <a:p>
             <a:r>
               <a:rPr lang="en-US" dirty="0"/>
               <a:t>Resources</a:t>
+            </a:r>
+          </a:p>
+          <a:p>
+            <a:pPr lvl="1"/>
+            <a:r>
+              <a:rPr lang="en-US" dirty="0"/>
+              <a:t>Lecture Notes: mpi_lecture_notes.md</a:t>
+            </a:r>
+          </a:p>
+          <a:p>
+            <a:pPr lvl="1"/>
+            <a:r>
+              <a:rPr lang="en-US" dirty="0"/>
+              <a:t>This PowerPoint: MPI_Workshop.pptx</a:t>
+            </a:r>
+          </a:p>
+          <a:p>
+            <a:pPr lvl="1"/>
+            <a:r>
+              <a:rPr lang="en-US" dirty="0"/>
+              <a:t>Code/Final Code: Links in README.md</a:t>
             </a:r>
           </a:p>
         </p:txBody>

</xml_diff>

<commit_message>
This is not procrastination
</commit_message>
<xml_diff>
--- a/MPI_Workshop.pptx
+++ b/MPI_Workshop.pptx
@@ -30,6 +30,7 @@
     <p:sldId id="315" r:id="rId24"/>
     <p:sldId id="316" r:id="rId25"/>
     <p:sldId id="317" r:id="rId26"/>
+    <p:sldId id="321" r:id="rId27"/>
   </p:sldIdLst>
   <p:sldSz cx="12192000" cy="6858000"/>
   <p:notesSz cx="6858000" cy="9144000"/>
@@ -17463,7 +17464,7 @@
           <a:p>
             <a:r>
               <a:rPr lang="en-US" dirty="0"/>
-              <a:t>Need a wait routine (or test routing ) to make sure data is ready to be modified</a:t>
+              <a:t>Need a wait routine (or test routine) to make sure data is ready to be modified</a:t>
             </a:r>
           </a:p>
           <a:p>
@@ -21350,6 +21351,149 @@
 </p:sld>
 </file>
 
+<file path=ppt/slides/slide26.xml><?xml version="1.0" encoding="utf-8"?>
+<p:sld xmlns:a="http://schemas.openxmlformats.org/drawingml/2006/main" xmlns:r="http://schemas.openxmlformats.org/officeDocument/2006/relationships" xmlns:p="http://schemas.openxmlformats.org/presentationml/2006/main">
+  <p:cSld>
+    <p:spTree>
+      <p:nvGrpSpPr>
+        <p:cNvPr id="1" name=""/>
+        <p:cNvGrpSpPr/>
+        <p:nvPr/>
+      </p:nvGrpSpPr>
+      <p:grpSpPr>
+        <a:xfrm>
+          <a:off x="0" y="0"/>
+          <a:ext cx="0" cy="0"/>
+          <a:chOff x="0" y="0"/>
+          <a:chExt cx="0" cy="0"/>
+        </a:xfrm>
+      </p:grpSpPr>
+      <p:sp>
+        <p:nvSpPr>
+          <p:cNvPr id="2" name="Title 1">
+            <a:extLst>
+              <a:ext uri="{FF2B5EF4-FFF2-40B4-BE49-F238E27FC236}">
+                <a16:creationId xmlns:a16="http://schemas.microsoft.com/office/drawing/2014/main" id="{FCF0DFF6-8648-457D-8AF4-33A4A343453E}"/>
+              </a:ext>
+            </a:extLst>
+          </p:cNvPr>
+          <p:cNvSpPr>
+            <a:spLocks noGrp="1"/>
+          </p:cNvSpPr>
+          <p:nvPr>
+            <p:ph type="title"/>
+          </p:nvPr>
+        </p:nvSpPr>
+        <p:spPr/>
+        <p:txBody>
+          <a:bodyPr/>
+          <a:lstStyle/>
+          <a:p>
+            <a:r>
+              <a:rPr lang="en-US" dirty="0"/>
+              <a:t>Resources</a:t>
+            </a:r>
+          </a:p>
+        </p:txBody>
+      </p:sp>
+      <p:sp>
+        <p:nvSpPr>
+          <p:cNvPr id="3" name="Content Placeholder 2">
+            <a:extLst>
+              <a:ext uri="{FF2B5EF4-FFF2-40B4-BE49-F238E27FC236}">
+                <a16:creationId xmlns:a16="http://schemas.microsoft.com/office/drawing/2014/main" id="{478453E2-14DF-446A-A056-4A2CDE6E984E}"/>
+              </a:ext>
+            </a:extLst>
+          </p:cNvPr>
+          <p:cNvSpPr>
+            <a:spLocks noGrp="1"/>
+          </p:cNvSpPr>
+          <p:nvPr>
+            <p:ph idx="1"/>
+          </p:nvPr>
+        </p:nvSpPr>
+        <p:spPr/>
+        <p:txBody>
+          <a:bodyPr>
+            <a:normAutofit/>
+          </a:bodyPr>
+          <a:lstStyle/>
+          <a:p>
+            <a:r>
+              <a:rPr lang="en-US" dirty="0"/>
+              <a:t>MPI Tutorial - </a:t>
+            </a:r>
+            <a:r>
+              <a:rPr lang="en-US" dirty="0">
+                <a:hlinkClick r:id="rId2"/>
+              </a:rPr>
+              <a:t>https://computing.llnl.gov/tutorials/mpi/</a:t>
+            </a:r>
+            <a:r>
+              <a:rPr lang="en-US" dirty="0"/>
+              <a:t> (in C and Fortran)</a:t>
+            </a:r>
+          </a:p>
+          <a:p>
+            <a:r>
+              <a:rPr lang="en-US" dirty="0"/>
+              <a:t>mpi4py docs - </a:t>
+            </a:r>
+            <a:r>
+              <a:rPr lang="en-US" dirty="0">
+                <a:hlinkClick r:id="rId3"/>
+              </a:rPr>
+              <a:t>https://mpi4py.readthedocs.io/en/stable/</a:t>
+            </a:r>
+            <a:endParaRPr lang="en-US" dirty="0"/>
+          </a:p>
+          <a:p>
+            <a:r>
+              <a:rPr lang="en-US" dirty="0"/>
+              <a:t>Some more on Non-Blocking </a:t>
+            </a:r>
+            <a:r>
+              <a:rPr lang="en-US" dirty="0">
+                <a:hlinkClick r:id="rId4"/>
+              </a:rPr>
+              <a:t>https://www.codingame.com/playgrounds/349/introduction-to-mpi/non-blocking-communications---exercise</a:t>
+            </a:r>
+            <a:endParaRPr lang="en-US" dirty="0"/>
+          </a:p>
+          <a:p>
+            <a:r>
+              <a:rPr lang="en-US" dirty="0"/>
+              <a:t>Cannon's Algorithm - </a:t>
+            </a:r>
+            <a:r>
+              <a:rPr lang="en-US" dirty="0">
+                <a:hlinkClick r:id="rId5"/>
+              </a:rPr>
+              <a:t>https://en.wikipedia.org/wiki/Cannon%27s</a:t>
+            </a:r>
+            <a:r>
+              <a:rPr lang="en-US">
+                <a:hlinkClick r:id="rId5"/>
+              </a:rPr>
+              <a:t>_algorithm</a:t>
+            </a:r>
+            <a:endParaRPr lang="en-US"/>
+          </a:p>
+        </p:txBody>
+      </p:sp>
+    </p:spTree>
+    <p:extLst>
+      <p:ext uri="{BB962C8B-B14F-4D97-AF65-F5344CB8AC3E}">
+        <p14:creationId xmlns:p14="http://schemas.microsoft.com/office/powerpoint/2010/main" val="4262777141"/>
+      </p:ext>
+    </p:extLst>
+  </p:cSld>
+  <p:clrMapOvr>
+    <a:masterClrMapping/>
+  </p:clrMapOvr>
+</p:sld>
+</file>
+
 <file path=ppt/slides/slide3.xml><?xml version="1.0" encoding="utf-8"?>
 <p:sld xmlns:a="http://schemas.openxmlformats.org/drawingml/2006/main" xmlns:r="http://schemas.openxmlformats.org/officeDocument/2006/relationships" xmlns:p="http://schemas.openxmlformats.org/presentationml/2006/main">
   <p:cSld>

</xml_diff>